<commit_message>
GF#20860 made arror bidirectional
In sdc-generic-workflow ppt (image source) and png (image) the arrow in step 4.1 was made bi-directional to show retrieval and response
</commit_message>
<xml_diff>
--- a/input/images-source/sdc-generic-workflow.pptx
+++ b/input/images-source/sdc-generic-workflow.pptx
@@ -303,7 +303,7 @@
             <a:fld id="{C69E31BE-431C-4F96-86FE-0099C953F73C}" type="datetimeFigureOut">
               <a:rPr lang="en-US" smtClean="0"/>
               <a:pPr/>
-              <a:t>8/28/2018</a:t>
+              <a:t>11/12/2019</a:t>
             </a:fld>
             <a:endParaRPr lang="en-US"/>
           </a:p>
@@ -473,7 +473,7 @@
             <a:fld id="{C69E31BE-431C-4F96-86FE-0099C953F73C}" type="datetimeFigureOut">
               <a:rPr lang="en-US" smtClean="0"/>
               <a:pPr/>
-              <a:t>8/28/2018</a:t>
+              <a:t>11/12/2019</a:t>
             </a:fld>
             <a:endParaRPr lang="en-US"/>
           </a:p>
@@ -653,7 +653,7 @@
             <a:fld id="{C69E31BE-431C-4F96-86FE-0099C953F73C}" type="datetimeFigureOut">
               <a:rPr lang="en-US" smtClean="0"/>
               <a:pPr/>
-              <a:t>8/28/2018</a:t>
+              <a:t>11/12/2019</a:t>
             </a:fld>
             <a:endParaRPr lang="en-US"/>
           </a:p>
@@ -823,7 +823,7 @@
             <a:fld id="{C69E31BE-431C-4F96-86FE-0099C953F73C}" type="datetimeFigureOut">
               <a:rPr lang="en-US" smtClean="0"/>
               <a:pPr/>
-              <a:t>8/28/2018</a:t>
+              <a:t>11/12/2019</a:t>
             </a:fld>
             <a:endParaRPr lang="en-US"/>
           </a:p>
@@ -1070,7 +1070,7 @@
             <a:fld id="{C69E31BE-431C-4F96-86FE-0099C953F73C}" type="datetimeFigureOut">
               <a:rPr lang="en-US" smtClean="0"/>
               <a:pPr/>
-              <a:t>8/28/2018</a:t>
+              <a:t>11/12/2019</a:t>
             </a:fld>
             <a:endParaRPr lang="en-US"/>
           </a:p>
@@ -1357,7 +1357,7 @@
             <a:fld id="{C69E31BE-431C-4F96-86FE-0099C953F73C}" type="datetimeFigureOut">
               <a:rPr lang="en-US" smtClean="0"/>
               <a:pPr/>
-              <a:t>8/28/2018</a:t>
+              <a:t>11/12/2019</a:t>
             </a:fld>
             <a:endParaRPr lang="en-US"/>
           </a:p>
@@ -1778,7 +1778,7 @@
             <a:fld id="{C69E31BE-431C-4F96-86FE-0099C953F73C}" type="datetimeFigureOut">
               <a:rPr lang="en-US" smtClean="0"/>
               <a:pPr/>
-              <a:t>8/28/2018</a:t>
+              <a:t>11/12/2019</a:t>
             </a:fld>
             <a:endParaRPr lang="en-US"/>
           </a:p>
@@ -1897,7 +1897,7 @@
             <a:fld id="{C69E31BE-431C-4F96-86FE-0099C953F73C}" type="datetimeFigureOut">
               <a:rPr lang="en-US" smtClean="0"/>
               <a:pPr/>
-              <a:t>8/28/2018</a:t>
+              <a:t>11/12/2019</a:t>
             </a:fld>
             <a:endParaRPr lang="en-US"/>
           </a:p>
@@ -1994,7 +1994,7 @@
             <a:fld id="{C69E31BE-431C-4F96-86FE-0099C953F73C}" type="datetimeFigureOut">
               <a:rPr lang="en-US" smtClean="0"/>
               <a:pPr/>
-              <a:t>8/28/2018</a:t>
+              <a:t>11/12/2019</a:t>
             </a:fld>
             <a:endParaRPr lang="en-US"/>
           </a:p>
@@ -2271,7 +2271,7 @@
             <a:fld id="{C69E31BE-431C-4F96-86FE-0099C953F73C}" type="datetimeFigureOut">
               <a:rPr lang="en-US" smtClean="0"/>
               <a:pPr/>
-              <a:t>8/28/2018</a:t>
+              <a:t>11/12/2019</a:t>
             </a:fld>
             <a:endParaRPr lang="en-US"/>
           </a:p>
@@ -2525,7 +2525,7 @@
             <a:fld id="{C69E31BE-431C-4F96-86FE-0099C953F73C}" type="datetimeFigureOut">
               <a:rPr lang="en-US" smtClean="0"/>
               <a:pPr/>
-              <a:t>8/28/2018</a:t>
+              <a:t>11/12/2019</a:t>
             </a:fld>
             <a:endParaRPr lang="en-US"/>
           </a:p>
@@ -2738,7 +2738,7 @@
             <a:fld id="{C69E31BE-431C-4F96-86FE-0099C953F73C}" type="datetimeFigureOut">
               <a:rPr lang="en-US" smtClean="0"/>
               <a:pPr/>
-              <a:t>8/28/2018</a:t>
+              <a:t>11/12/2019</a:t>
             </a:fld>
             <a:endParaRPr lang="en-US"/>
           </a:p>
@@ -5580,7 +5580,7 @@
               <a:schemeClr val="tx1"/>
             </a:solidFill>
             <a:headEnd type="triangle" w="med" len="med"/>
-            <a:tailEnd type="none" w="med" len="med"/>
+            <a:tailEnd type="triangle" w="med" len="med"/>
           </a:ln>
         </p:spPr>
         <p:style>
@@ -6376,12 +6376,9 @@
 </file>
 
 <file path=customXml/item1.xml><?xml version="1.0" encoding="utf-8"?>
-<?mso-contentType ?>
-<FormTemplates xmlns="http://schemas.microsoft.com/sharepoint/v3/contenttype/forms">
-  <Display>DocumentLibraryForm</Display>
-  <Edit>DocumentLibraryForm</Edit>
-  <New>DocumentLibraryForm</New>
-</FormTemplates>
+<p:properties xmlns:p="http://schemas.microsoft.com/office/2006/metadata/properties" xmlns:xsi="http://www.w3.org/2001/XMLSchema-instance">
+  <documentManagement/>
+</p:properties>
 </file>
 
 <file path=customXml/item2.xml><?xml version="1.0" encoding="utf-8"?>
@@ -6434,15 +6431,24 @@
 </file>
 
 <file path=customXml/item3.xml><?xml version="1.0" encoding="utf-8"?>
-<p:properties xmlns:p="http://schemas.microsoft.com/office/2006/metadata/properties" xmlns:xsi="http://www.w3.org/2001/XMLSchema-instance">
-  <documentManagement/>
-</p:properties>
+<?mso-contentType ?>
+<FormTemplates xmlns="http://schemas.microsoft.com/sharepoint/v3/contenttype/forms">
+  <Display>DocumentLibraryForm</Display>
+  <Edit>DocumentLibraryForm</Edit>
+  <New>DocumentLibraryForm</New>
+</FormTemplates>
 </file>
 
 <file path=customXml/itemProps1.xml><?xml version="1.0" encoding="utf-8"?>
-<ds:datastoreItem xmlns:ds="http://schemas.openxmlformats.org/officeDocument/2006/customXml" ds:itemID="{93867DCD-913B-4BE7-B218-6A941DDB47CC}">
+<ds:datastoreItem xmlns:ds="http://schemas.openxmlformats.org/officeDocument/2006/customXml" ds:itemID="{AA05AFCB-176E-411D-8F54-3F7328DC8DF9}">
   <ds:schemaRefs>
-    <ds:schemaRef ds:uri="http://schemas.microsoft.com/sharepoint/v3/contenttype/forms"/>
+    <ds:schemaRef ds:uri="http://purl.org/dc/dcmitype/"/>
+    <ds:schemaRef ds:uri="http://www.w3.org/XML/1998/namespace"/>
+    <ds:schemaRef ds:uri="http://schemas.openxmlformats.org/package/2006/metadata/core-properties"/>
+    <ds:schemaRef ds:uri="http://schemas.microsoft.com/office/2006/documentManagement/types"/>
+    <ds:schemaRef ds:uri="http://purl.org/dc/terms/"/>
+    <ds:schemaRef ds:uri="http://schemas.microsoft.com/office/2006/metadata/properties"/>
+    <ds:schemaRef ds:uri="http://purl.org/dc/elements/1.1/"/>
   </ds:schemaRefs>
 </ds:datastoreItem>
 </file>
@@ -6463,15 +6469,9 @@
 </file>
 
 <file path=customXml/itemProps3.xml><?xml version="1.0" encoding="utf-8"?>
-<ds:datastoreItem xmlns:ds="http://schemas.openxmlformats.org/officeDocument/2006/customXml" ds:itemID="{AA05AFCB-176E-411D-8F54-3F7328DC8DF9}">
+<ds:datastoreItem xmlns:ds="http://schemas.openxmlformats.org/officeDocument/2006/customXml" ds:itemID="{93867DCD-913B-4BE7-B218-6A941DDB47CC}">
   <ds:schemaRefs>
-    <ds:schemaRef ds:uri="http://purl.org/dc/dcmitype/"/>
-    <ds:schemaRef ds:uri="http://www.w3.org/XML/1998/namespace"/>
-    <ds:schemaRef ds:uri="http://schemas.openxmlformats.org/package/2006/metadata/core-properties"/>
-    <ds:schemaRef ds:uri="http://schemas.microsoft.com/office/2006/documentManagement/types"/>
-    <ds:schemaRef ds:uri="http://purl.org/dc/terms/"/>
-    <ds:schemaRef ds:uri="http://schemas.microsoft.com/office/2006/metadata/properties"/>
-    <ds:schemaRef ds:uri="http://purl.org/dc/elements/1.1/"/>
+    <ds:schemaRef ds:uri="http://schemas.microsoft.com/sharepoint/v3/contenttype/forms"/>
   </ds:schemaRefs>
 </ds:datastoreItem>
 </file>
</xml_diff>

<commit_message>
Added workflow information.  Also corrected all schema references to jive with the new location. https://jira.hl7.org/browse/FHIR-20515
</commit_message>
<xml_diff>
--- a/input/images-source/sdc-generic-workflow.pptx
+++ b/input/images-source/sdc-generic-workflow.pptx
@@ -7,14 +7,14 @@
   <p:sldIdLst>
     <p:sldId id="256" r:id="rId5"/>
   </p:sldIdLst>
-  <p:sldSz cx="7380288" cy="11520488"/>
+  <p:sldSz cx="6483350" cy="10079038"/>
   <p:notesSz cx="6858000" cy="9144000"/>
   <p:defaultTextStyle>
     <a:defPPr>
       <a:defRPr lang="en-US"/>
     </a:defPPr>
-    <a:lvl1pPr marL="0" algn="l" defTabSz="755955" rtl="0" eaLnBrk="1" latinLnBrk="0" hangingPunct="1">
-      <a:defRPr sz="1513" kern="1200">
+    <a:lvl1pPr marL="0" algn="l" defTabSz="662354" rtl="0" eaLnBrk="1" latinLnBrk="0" hangingPunct="1">
+      <a:defRPr sz="1325" kern="1200">
         <a:solidFill>
           <a:schemeClr val="tx1"/>
         </a:solidFill>
@@ -23,8 +23,8 @@
         <a:cs typeface="+mn-cs"/>
       </a:defRPr>
     </a:lvl1pPr>
-    <a:lvl2pPr marL="377977" algn="l" defTabSz="755955" rtl="0" eaLnBrk="1" latinLnBrk="0" hangingPunct="1">
-      <a:defRPr sz="1513" kern="1200">
+    <a:lvl2pPr marL="331177" algn="l" defTabSz="662354" rtl="0" eaLnBrk="1" latinLnBrk="0" hangingPunct="1">
+      <a:defRPr sz="1325" kern="1200">
         <a:solidFill>
           <a:schemeClr val="tx1"/>
         </a:solidFill>
@@ -33,8 +33,8 @@
         <a:cs typeface="+mn-cs"/>
       </a:defRPr>
     </a:lvl2pPr>
-    <a:lvl3pPr marL="755955" algn="l" defTabSz="755955" rtl="0" eaLnBrk="1" latinLnBrk="0" hangingPunct="1">
-      <a:defRPr sz="1513" kern="1200">
+    <a:lvl3pPr marL="662354" algn="l" defTabSz="662354" rtl="0" eaLnBrk="1" latinLnBrk="0" hangingPunct="1">
+      <a:defRPr sz="1325" kern="1200">
         <a:solidFill>
           <a:schemeClr val="tx1"/>
         </a:solidFill>
@@ -43,8 +43,8 @@
         <a:cs typeface="+mn-cs"/>
       </a:defRPr>
     </a:lvl3pPr>
-    <a:lvl4pPr marL="1133930" algn="l" defTabSz="755955" rtl="0" eaLnBrk="1" latinLnBrk="0" hangingPunct="1">
-      <a:defRPr sz="1513" kern="1200">
+    <a:lvl4pPr marL="993529" algn="l" defTabSz="662354" rtl="0" eaLnBrk="1" latinLnBrk="0" hangingPunct="1">
+      <a:defRPr sz="1325" kern="1200">
         <a:solidFill>
           <a:schemeClr val="tx1"/>
         </a:solidFill>
@@ -53,8 +53,8 @@
         <a:cs typeface="+mn-cs"/>
       </a:defRPr>
     </a:lvl4pPr>
-    <a:lvl5pPr marL="1511906" algn="l" defTabSz="755955" rtl="0" eaLnBrk="1" latinLnBrk="0" hangingPunct="1">
-      <a:defRPr sz="1513" kern="1200">
+    <a:lvl5pPr marL="1324706" algn="l" defTabSz="662354" rtl="0" eaLnBrk="1" latinLnBrk="0" hangingPunct="1">
+      <a:defRPr sz="1325" kern="1200">
         <a:solidFill>
           <a:schemeClr val="tx1"/>
         </a:solidFill>
@@ -63,8 +63,8 @@
         <a:cs typeface="+mn-cs"/>
       </a:defRPr>
     </a:lvl5pPr>
-    <a:lvl6pPr marL="1889883" algn="l" defTabSz="755955" rtl="0" eaLnBrk="1" latinLnBrk="0" hangingPunct="1">
-      <a:defRPr sz="1513" kern="1200">
+    <a:lvl6pPr marL="1655883" algn="l" defTabSz="662354" rtl="0" eaLnBrk="1" latinLnBrk="0" hangingPunct="1">
+      <a:defRPr sz="1325" kern="1200">
         <a:solidFill>
           <a:schemeClr val="tx1"/>
         </a:solidFill>
@@ -73,8 +73,8 @@
         <a:cs typeface="+mn-cs"/>
       </a:defRPr>
     </a:lvl6pPr>
-    <a:lvl7pPr marL="2267861" algn="l" defTabSz="755955" rtl="0" eaLnBrk="1" latinLnBrk="0" hangingPunct="1">
-      <a:defRPr sz="1513" kern="1200">
+    <a:lvl7pPr marL="1987060" algn="l" defTabSz="662354" rtl="0" eaLnBrk="1" latinLnBrk="0" hangingPunct="1">
+      <a:defRPr sz="1325" kern="1200">
         <a:solidFill>
           <a:schemeClr val="tx1"/>
         </a:solidFill>
@@ -83,8 +83,8 @@
         <a:cs typeface="+mn-cs"/>
       </a:defRPr>
     </a:lvl7pPr>
-    <a:lvl8pPr marL="2645840" algn="l" defTabSz="755955" rtl="0" eaLnBrk="1" latinLnBrk="0" hangingPunct="1">
-      <a:defRPr sz="1513" kern="1200">
+    <a:lvl8pPr marL="2318239" algn="l" defTabSz="662354" rtl="0" eaLnBrk="1" latinLnBrk="0" hangingPunct="1">
+      <a:defRPr sz="1325" kern="1200">
         <a:solidFill>
           <a:schemeClr val="tx1"/>
         </a:solidFill>
@@ -93,8 +93,8 @@
         <a:cs typeface="+mn-cs"/>
       </a:defRPr>
     </a:lvl8pPr>
-    <a:lvl9pPr marL="3023813" algn="l" defTabSz="755955" rtl="0" eaLnBrk="1" latinLnBrk="0" hangingPunct="1">
-      <a:defRPr sz="1513" kern="1200">
+    <a:lvl9pPr marL="2649412" algn="l" defTabSz="662354" rtl="0" eaLnBrk="1" latinLnBrk="0" hangingPunct="1">
+      <a:defRPr sz="1325" kern="1200">
         <a:solidFill>
           <a:schemeClr val="tx1"/>
         </a:solidFill>
@@ -107,12 +107,12 @@
   <p:extLst>
     <p:ext uri="{EFAFB233-063F-42B5-8137-9DF3F51BA10A}">
       <p15:sldGuideLst xmlns:p15="http://schemas.microsoft.com/office/powerpoint/2012/main">
-        <p15:guide id="1" orient="horz" pos="3629" userDrawn="1">
+        <p15:guide id="1" orient="horz" pos="3175" userDrawn="1">
           <p15:clr>
             <a:srgbClr val="A4A3A4"/>
           </p15:clr>
         </p15:guide>
-        <p15:guide id="2" pos="2326" userDrawn="1">
+        <p15:guide id="2" pos="2043" userDrawn="1">
           <p15:clr>
             <a:srgbClr val="A4A3A4"/>
           </p15:clr>
@@ -152,8 +152,8 @@
         </p:nvSpPr>
         <p:spPr>
           <a:xfrm>
-            <a:off x="553538" y="3578836"/>
-            <a:ext cx="6273246" cy="2469436"/>
+            <a:off x="486267" y="3131051"/>
+            <a:ext cx="5510848" cy="2160458"/>
           </a:xfrm>
         </p:spPr>
         <p:txBody>
@@ -179,8 +179,8 @@
         </p:nvSpPr>
         <p:spPr>
           <a:xfrm>
-            <a:off x="1107060" y="6528293"/>
-            <a:ext cx="5166202" cy="2944125"/>
+            <a:off x="972518" y="5711469"/>
+            <a:ext cx="4538345" cy="2575755"/>
           </a:xfrm>
         </p:spPr>
         <p:txBody>
@@ -303,7 +303,7 @@
             <a:fld id="{C69E31BE-431C-4F96-86FE-0099C953F73C}" type="datetimeFigureOut">
               <a:rPr lang="en-US" smtClean="0"/>
               <a:pPr/>
-              <a:t>11/12/2019</a:t>
+              <a:t>9/6/2021</a:t>
             </a:fld>
             <a:endParaRPr lang="en-US"/>
           </a:p>
@@ -473,7 +473,7 @@
             <a:fld id="{C69E31BE-431C-4F96-86FE-0099C953F73C}" type="datetimeFigureOut">
               <a:rPr lang="en-US" smtClean="0"/>
               <a:pPr/>
-              <a:t>11/12/2019</a:t>
+              <a:t>9/6/2021</a:t>
             </a:fld>
             <a:endParaRPr lang="en-US"/>
           </a:p>
@@ -564,8 +564,8 @@
         </p:nvSpPr>
         <p:spPr>
           <a:xfrm>
-            <a:off x="4013046" y="861379"/>
-            <a:ext cx="1245426" cy="18347446"/>
+            <a:off x="3525334" y="753603"/>
+            <a:ext cx="1094068" cy="16051804"/>
           </a:xfrm>
         </p:spPr>
         <p:txBody>
@@ -591,8 +591,8 @@
         </p:nvSpPr>
         <p:spPr>
           <a:xfrm>
-            <a:off x="276781" y="861379"/>
-            <a:ext cx="3613266" cy="18347446"/>
+            <a:off x="243144" y="753603"/>
+            <a:ext cx="3174140" cy="16051804"/>
           </a:xfrm>
         </p:spPr>
         <p:txBody>
@@ -653,7 +653,7 @@
             <a:fld id="{C69E31BE-431C-4F96-86FE-0099C953F73C}" type="datetimeFigureOut">
               <a:rPr lang="en-US" smtClean="0"/>
               <a:pPr/>
-              <a:t>11/12/2019</a:t>
+              <a:t>9/6/2021</a:t>
             </a:fld>
             <a:endParaRPr lang="en-US"/>
           </a:p>
@@ -823,7 +823,7 @@
             <a:fld id="{C69E31BE-431C-4F96-86FE-0099C953F73C}" type="datetimeFigureOut">
               <a:rPr lang="en-US" smtClean="0"/>
               <a:pPr/>
-              <a:t>11/12/2019</a:t>
+              <a:t>9/6/2021</a:t>
             </a:fld>
             <a:endParaRPr lang="en-US"/>
           </a:p>
@@ -914,8 +914,8 @@
         </p:nvSpPr>
         <p:spPr>
           <a:xfrm>
-            <a:off x="583006" y="7403006"/>
-            <a:ext cx="6273246" cy="2288095"/>
+            <a:off x="512153" y="6476738"/>
+            <a:ext cx="5510848" cy="2001807"/>
           </a:xfrm>
         </p:spPr>
         <p:txBody>
@@ -945,8 +945,8 @@
         </p:nvSpPr>
         <p:spPr>
           <a:xfrm>
-            <a:off x="583006" y="4882898"/>
-            <a:ext cx="6273246" cy="2520105"/>
+            <a:off x="512153" y="4271948"/>
+            <a:ext cx="5510848" cy="2204788"/>
           </a:xfrm>
         </p:spPr>
         <p:txBody>
@@ -1070,7 +1070,7 @@
             <a:fld id="{C69E31BE-431C-4F96-86FE-0099C953F73C}" type="datetimeFigureOut">
               <a:rPr lang="en-US" smtClean="0"/>
               <a:pPr/>
-              <a:t>11/12/2019</a:t>
+              <a:t>9/6/2021</a:t>
             </a:fld>
             <a:endParaRPr lang="en-US"/>
           </a:p>
@@ -1183,8 +1183,8 @@
         </p:nvSpPr>
         <p:spPr>
           <a:xfrm>
-            <a:off x="369031" y="2688128"/>
-            <a:ext cx="3259630" cy="7602992"/>
+            <a:off x="324182" y="2351788"/>
+            <a:ext cx="2863483" cy="6651702"/>
           </a:xfrm>
         </p:spPr>
         <p:txBody>
@@ -1267,8 +1267,8 @@
         </p:nvSpPr>
         <p:spPr>
           <a:xfrm>
-            <a:off x="3751658" y="2688128"/>
-            <a:ext cx="3259630" cy="7602992"/>
+            <a:off x="3295713" y="2351788"/>
+            <a:ext cx="2863483" cy="6651702"/>
           </a:xfrm>
         </p:spPr>
         <p:txBody>
@@ -1357,7 +1357,7 @@
             <a:fld id="{C69E31BE-431C-4F96-86FE-0099C953F73C}" type="datetimeFigureOut">
               <a:rPr lang="en-US" smtClean="0"/>
               <a:pPr/>
-              <a:t>11/12/2019</a:t>
+              <a:t>9/6/2021</a:t>
             </a:fld>
             <a:endParaRPr lang="en-US"/>
           </a:p>
@@ -1474,8 +1474,8 @@
         </p:nvSpPr>
         <p:spPr>
           <a:xfrm>
-            <a:off x="369029" y="2578785"/>
-            <a:ext cx="3260909" cy="1074714"/>
+            <a:off x="324181" y="2256125"/>
+            <a:ext cx="2864606" cy="940246"/>
           </a:xfrm>
         </p:spPr>
         <p:txBody>
@@ -1539,8 +1539,8 @@
         </p:nvSpPr>
         <p:spPr>
           <a:xfrm>
-            <a:off x="369029" y="3653493"/>
-            <a:ext cx="3260909" cy="6637619"/>
+            <a:off x="324181" y="3196366"/>
+            <a:ext cx="2864606" cy="5807117"/>
           </a:xfrm>
         </p:spPr>
         <p:txBody>
@@ -1623,8 +1623,8 @@
         </p:nvSpPr>
         <p:spPr>
           <a:xfrm>
-            <a:off x="3749110" y="2578785"/>
-            <a:ext cx="3262191" cy="1074714"/>
+            <a:off x="3293476" y="2256125"/>
+            <a:ext cx="2865732" cy="940246"/>
           </a:xfrm>
         </p:spPr>
         <p:txBody>
@@ -1688,8 +1688,8 @@
         </p:nvSpPr>
         <p:spPr>
           <a:xfrm>
-            <a:off x="3749110" y="3653493"/>
-            <a:ext cx="3262191" cy="6637619"/>
+            <a:off x="3293476" y="3196366"/>
+            <a:ext cx="2865732" cy="5807117"/>
           </a:xfrm>
         </p:spPr>
         <p:txBody>
@@ -1778,7 +1778,7 @@
             <a:fld id="{C69E31BE-431C-4F96-86FE-0099C953F73C}" type="datetimeFigureOut">
               <a:rPr lang="en-US" smtClean="0"/>
               <a:pPr/>
-              <a:t>11/12/2019</a:t>
+              <a:t>9/6/2021</a:t>
             </a:fld>
             <a:endParaRPr lang="en-US"/>
           </a:p>
@@ -1897,7 +1897,7 @@
             <a:fld id="{C69E31BE-431C-4F96-86FE-0099C953F73C}" type="datetimeFigureOut">
               <a:rPr lang="en-US" smtClean="0"/>
               <a:pPr/>
-              <a:t>11/12/2019</a:t>
+              <a:t>9/6/2021</a:t>
             </a:fld>
             <a:endParaRPr lang="en-US"/>
           </a:p>
@@ -1994,7 +1994,7 @@
             <a:fld id="{C69E31BE-431C-4F96-86FE-0099C953F73C}" type="datetimeFigureOut">
               <a:rPr lang="en-US" smtClean="0"/>
               <a:pPr/>
-              <a:t>11/12/2019</a:t>
+              <a:t>9/6/2021</a:t>
             </a:fld>
             <a:endParaRPr lang="en-US"/>
           </a:p>
@@ -2085,8 +2085,8 @@
         </p:nvSpPr>
         <p:spPr>
           <a:xfrm>
-            <a:off x="369045" y="458705"/>
-            <a:ext cx="2428065" cy="1952083"/>
+            <a:off x="324196" y="401312"/>
+            <a:ext cx="2132978" cy="1707837"/>
           </a:xfrm>
         </p:spPr>
         <p:txBody>
@@ -2116,8 +2116,8 @@
         </p:nvSpPr>
         <p:spPr>
           <a:xfrm>
-            <a:off x="2885508" y="458705"/>
-            <a:ext cx="4125788" cy="9832417"/>
+            <a:off x="2534827" y="401312"/>
+            <a:ext cx="3624375" cy="8602179"/>
           </a:xfrm>
         </p:spPr>
         <p:txBody>
@@ -2200,8 +2200,8 @@
         </p:nvSpPr>
         <p:spPr>
           <a:xfrm>
-            <a:off x="369045" y="2410783"/>
-            <a:ext cx="2428065" cy="7880334"/>
+            <a:off x="324196" y="2109145"/>
+            <a:ext cx="2132978" cy="6894342"/>
           </a:xfrm>
         </p:spPr>
         <p:txBody>
@@ -2271,7 +2271,7 @@
             <a:fld id="{C69E31BE-431C-4F96-86FE-0099C953F73C}" type="datetimeFigureOut">
               <a:rPr lang="en-US" smtClean="0"/>
               <a:pPr/>
-              <a:t>11/12/2019</a:t>
+              <a:t>9/6/2021</a:t>
             </a:fld>
             <a:endParaRPr lang="en-US"/>
           </a:p>
@@ -2362,8 +2362,8 @@
         </p:nvSpPr>
         <p:spPr>
           <a:xfrm>
-            <a:off x="1446613" y="8064363"/>
-            <a:ext cx="4428173" cy="952043"/>
+            <a:off x="1270804" y="7055347"/>
+            <a:ext cx="3890010" cy="832923"/>
           </a:xfrm>
         </p:spPr>
         <p:txBody>
@@ -2393,8 +2393,8 @@
         </p:nvSpPr>
         <p:spPr>
           <a:xfrm>
-            <a:off x="1446613" y="1029388"/>
-            <a:ext cx="4428173" cy="6912293"/>
+            <a:off x="1270804" y="900591"/>
+            <a:ext cx="3890010" cy="6047423"/>
           </a:xfrm>
         </p:spPr>
         <p:txBody>
@@ -2454,8 +2454,8 @@
         </p:nvSpPr>
         <p:spPr>
           <a:xfrm>
-            <a:off x="1446613" y="9016396"/>
-            <a:ext cx="4428173" cy="1352056"/>
+            <a:off x="1270804" y="7888260"/>
+            <a:ext cx="3890010" cy="1182886"/>
           </a:xfrm>
         </p:spPr>
         <p:txBody>
@@ -2525,7 +2525,7 @@
             <a:fld id="{C69E31BE-431C-4F96-86FE-0099C953F73C}" type="datetimeFigureOut">
               <a:rPr lang="en-US" smtClean="0"/>
               <a:pPr/>
-              <a:t>11/12/2019</a:t>
+              <a:t>9/6/2021</a:t>
             </a:fld>
             <a:endParaRPr lang="en-US"/>
           </a:p>
@@ -2621,8 +2621,8 @@
         </p:nvSpPr>
         <p:spPr>
           <a:xfrm>
-            <a:off x="369036" y="461369"/>
-            <a:ext cx="6642259" cy="1920082"/>
+            <a:off x="324187" y="403643"/>
+            <a:ext cx="5835015" cy="1679840"/>
           </a:xfrm>
           <a:prstGeom prst="rect">
             <a:avLst/>
@@ -2653,8 +2653,8 @@
         </p:nvSpPr>
         <p:spPr>
           <a:xfrm>
-            <a:off x="369036" y="2688128"/>
-            <a:ext cx="6642259" cy="7602992"/>
+            <a:off x="324187" y="2351788"/>
+            <a:ext cx="5835015" cy="6651702"/>
           </a:xfrm>
           <a:prstGeom prst="rect">
             <a:avLst/>
@@ -2714,8 +2714,8 @@
         </p:nvSpPr>
         <p:spPr>
           <a:xfrm>
-            <a:off x="369031" y="10677795"/>
-            <a:ext cx="1722068" cy="613362"/>
+            <a:off x="324183" y="9341783"/>
+            <a:ext cx="1512782" cy="536618"/>
           </a:xfrm>
           <a:prstGeom prst="rect">
             <a:avLst/>
@@ -2738,7 +2738,7 @@
             <a:fld id="{C69E31BE-431C-4F96-86FE-0099C953F73C}" type="datetimeFigureOut">
               <a:rPr lang="en-US" smtClean="0"/>
               <a:pPr/>
-              <a:t>11/12/2019</a:t>
+              <a:t>9/6/2021</a:t>
             </a:fld>
             <a:endParaRPr lang="en-US"/>
           </a:p>
@@ -2756,8 +2756,8 @@
         </p:nvSpPr>
         <p:spPr>
           <a:xfrm>
-            <a:off x="2521606" y="10677795"/>
-            <a:ext cx="2337092" cy="613362"/>
+            <a:off x="2215151" y="9341783"/>
+            <a:ext cx="2053062" cy="536618"/>
           </a:xfrm>
           <a:prstGeom prst="rect">
             <a:avLst/>
@@ -2793,8 +2793,8 @@
         </p:nvSpPr>
         <p:spPr>
           <a:xfrm>
-            <a:off x="5289222" y="10677795"/>
-            <a:ext cx="1722068" cy="613362"/>
+            <a:off x="4646416" y="9341783"/>
+            <a:ext cx="1512782" cy="536618"/>
           </a:xfrm>
           <a:prstGeom prst="rect">
             <a:avLst/>
@@ -3122,7 +3122,7 @@
         </p:nvSpPr>
         <p:spPr>
           <a:xfrm>
-            <a:off x="1170965" y="1221559"/>
+            <a:off x="772268" y="149615"/>
             <a:ext cx="1204195" cy="346409"/>
           </a:xfrm>
           <a:prstGeom prst="rect">
@@ -3189,7 +3189,7 @@
         </p:nvSpPr>
         <p:spPr>
           <a:xfrm>
-            <a:off x="2375160" y="1221559"/>
+            <a:off x="1976463" y="149615"/>
             <a:ext cx="1204195" cy="346409"/>
           </a:xfrm>
           <a:prstGeom prst="rect">
@@ -3244,7 +3244,7 @@
         </p:nvSpPr>
         <p:spPr>
           <a:xfrm>
-            <a:off x="3583660" y="1221559"/>
+            <a:off x="3184963" y="149615"/>
             <a:ext cx="1204195" cy="346409"/>
           </a:xfrm>
           <a:prstGeom prst="rect">
@@ -3301,7 +3301,7 @@
         </p:nvSpPr>
         <p:spPr>
           <a:xfrm>
-            <a:off x="1170965" y="1221553"/>
+            <a:off x="772268" y="149607"/>
             <a:ext cx="1204195" cy="9778830"/>
           </a:xfrm>
           <a:prstGeom prst="rect">
@@ -3348,7 +3348,7 @@
         </p:nvSpPr>
         <p:spPr>
           <a:xfrm>
-            <a:off x="2375160" y="1221558"/>
+            <a:off x="1976463" y="149612"/>
             <a:ext cx="1204195" cy="9777000"/>
           </a:xfrm>
           <a:prstGeom prst="rect">
@@ -3395,7 +3395,7 @@
         </p:nvSpPr>
         <p:spPr>
           <a:xfrm>
-            <a:off x="3579373" y="1221557"/>
+            <a:off x="3180676" y="149611"/>
             <a:ext cx="1204195" cy="9777000"/>
           </a:xfrm>
           <a:prstGeom prst="rect">
@@ -3442,7 +3442,7 @@
         </p:nvSpPr>
         <p:spPr>
           <a:xfrm>
-            <a:off x="1256987" y="7650212"/>
+            <a:off x="858290" y="6578266"/>
             <a:ext cx="1032167" cy="523620"/>
           </a:xfrm>
           <a:prstGeom prst="roundRect">
@@ -3495,7 +3495,7 @@
         </p:nvSpPr>
         <p:spPr>
           <a:xfrm>
-            <a:off x="6108283" y="10469271"/>
+            <a:off x="5709584" y="9397325"/>
             <a:ext cx="527226" cy="362030"/>
           </a:xfrm>
           <a:prstGeom prst="roundRect">
@@ -3548,7 +3548,7 @@
         </p:nvSpPr>
         <p:spPr>
           <a:xfrm>
-            <a:off x="1256987" y="9014744"/>
+            <a:off x="858290" y="7942800"/>
             <a:ext cx="1032167" cy="577347"/>
           </a:xfrm>
           <a:prstGeom prst="roundRect">
@@ -3601,7 +3601,7 @@
         </p:nvSpPr>
         <p:spPr>
           <a:xfrm>
-            <a:off x="4875716" y="9061607"/>
+            <a:off x="4477019" y="7989661"/>
             <a:ext cx="1032167" cy="485576"/>
           </a:xfrm>
           <a:prstGeom prst="roundRect">
@@ -3654,7 +3654,7 @@
         </p:nvSpPr>
         <p:spPr>
           <a:xfrm>
-            <a:off x="1256987" y="3858941"/>
+            <a:off x="858290" y="2786997"/>
             <a:ext cx="1032167" cy="986327"/>
           </a:xfrm>
           <a:prstGeom prst="roundRect">
@@ -3774,7 +3774,7 @@
         </p:nvSpPr>
         <p:spPr>
           <a:xfrm>
-            <a:off x="1256987" y="7071759"/>
+            <a:off x="858290" y="5999815"/>
             <a:ext cx="1032167" cy="461877"/>
           </a:xfrm>
           <a:prstGeom prst="roundRect">
@@ -3827,7 +3827,7 @@
         </p:nvSpPr>
         <p:spPr>
           <a:xfrm>
-            <a:off x="2489858" y="5603841"/>
+            <a:off x="2091161" y="4531895"/>
             <a:ext cx="1032167" cy="584116"/>
           </a:xfrm>
           <a:prstGeom prst="roundRect">
@@ -3880,7 +3880,7 @@
         </p:nvSpPr>
         <p:spPr>
           <a:xfrm>
-            <a:off x="1256987" y="6251688"/>
+            <a:off x="858290" y="5179742"/>
             <a:ext cx="1032167" cy="716084"/>
           </a:xfrm>
           <a:prstGeom prst="roundRect">
@@ -3956,7 +3956,7 @@
         </p:nvSpPr>
         <p:spPr>
           <a:xfrm>
-            <a:off x="2489858" y="4063429"/>
+            <a:off x="2091161" y="2991485"/>
             <a:ext cx="1032167" cy="577347"/>
           </a:xfrm>
           <a:prstGeom prst="roundRect">
@@ -4010,7 +4010,7 @@
         </p:nvSpPr>
         <p:spPr>
           <a:xfrm>
-            <a:off x="4875716" y="9662651"/>
+            <a:off x="4477019" y="8590707"/>
             <a:ext cx="1032167" cy="577347"/>
           </a:xfrm>
           <a:prstGeom prst="roundRect">
@@ -4067,7 +4067,7 @@
         </p:nvCxnSpPr>
         <p:spPr>
           <a:xfrm>
-            <a:off x="2289155" y="4352106"/>
+            <a:off x="1890458" y="3280162"/>
             <a:ext cx="200703" cy="1"/>
           </a:xfrm>
           <a:prstGeom prst="straightConnector1">
@@ -4105,7 +4105,7 @@
         </p:nvCxnSpPr>
         <p:spPr>
           <a:xfrm>
-            <a:off x="3005930" y="5472331"/>
+            <a:off x="2607231" y="4400385"/>
             <a:ext cx="0" cy="131518"/>
           </a:xfrm>
           <a:prstGeom prst="straightConnector1">
@@ -4143,7 +4143,7 @@
         </p:nvCxnSpPr>
         <p:spPr>
           <a:xfrm flipH="1">
-            <a:off x="2289155" y="5895899"/>
+            <a:off x="1890458" y="4823953"/>
             <a:ext cx="200703" cy="166"/>
           </a:xfrm>
           <a:prstGeom prst="straightConnector1">
@@ -4180,7 +4180,7 @@
         </p:nvCxnSpPr>
         <p:spPr>
           <a:xfrm>
-            <a:off x="1773060" y="6967781"/>
+            <a:off x="1374361" y="5895835"/>
             <a:ext cx="0" cy="103988"/>
           </a:xfrm>
           <a:prstGeom prst="straightConnector1">
@@ -4218,7 +4218,7 @@
         </p:nvCxnSpPr>
         <p:spPr>
           <a:xfrm>
-            <a:off x="1773060" y="7533643"/>
+            <a:off x="1374361" y="6461697"/>
             <a:ext cx="0" cy="116578"/>
           </a:xfrm>
           <a:prstGeom prst="straightConnector1">
@@ -4256,7 +4256,7 @@
         </p:nvCxnSpPr>
         <p:spPr>
           <a:xfrm>
-            <a:off x="1773063" y="8173834"/>
+            <a:off x="1374364" y="7101890"/>
             <a:ext cx="0" cy="119261"/>
           </a:xfrm>
           <a:prstGeom prst="straightConnector1">
@@ -4293,7 +4293,7 @@
         </p:nvCxnSpPr>
         <p:spPr>
           <a:xfrm>
-            <a:off x="2289148" y="9303418"/>
+            <a:off x="1890451" y="8231474"/>
             <a:ext cx="2586561" cy="975"/>
           </a:xfrm>
           <a:prstGeom prst="straightConnector1">
@@ -4330,7 +4330,7 @@
         </p:nvCxnSpPr>
         <p:spPr>
           <a:xfrm>
-            <a:off x="5391792" y="9547176"/>
+            <a:off x="4993093" y="8475230"/>
             <a:ext cx="0" cy="115472"/>
           </a:xfrm>
           <a:prstGeom prst="straightConnector1">
@@ -4368,7 +4368,7 @@
         </p:nvCxnSpPr>
         <p:spPr>
           <a:xfrm flipV="1">
-            <a:off x="5908388" y="10650287"/>
+            <a:off x="5509689" y="9578343"/>
             <a:ext cx="199894" cy="1"/>
           </a:xfrm>
           <a:prstGeom prst="straightConnector1">
@@ -4402,7 +4402,7 @@
         </p:nvSpPr>
         <p:spPr>
           <a:xfrm>
-            <a:off x="1256987" y="5655916"/>
+            <a:off x="858290" y="4583972"/>
             <a:ext cx="1032167" cy="480295"/>
           </a:xfrm>
           <a:prstGeom prst="roundRect">
@@ -4458,7 +4458,7 @@
         </p:nvCxnSpPr>
         <p:spPr>
           <a:xfrm>
-            <a:off x="1773055" y="6136219"/>
+            <a:off x="1374356" y="5064273"/>
             <a:ext cx="0" cy="115470"/>
           </a:xfrm>
           <a:prstGeom prst="straightConnector1">
@@ -4492,7 +4492,7 @@
         </p:nvSpPr>
         <p:spPr>
           <a:xfrm>
-            <a:off x="2489858" y="4756240"/>
+            <a:off x="2091161" y="3684294"/>
             <a:ext cx="1032167" cy="716084"/>
           </a:xfrm>
           <a:prstGeom prst="roundRect">
@@ -4571,7 +4571,7 @@
         </p:nvCxnSpPr>
         <p:spPr>
           <a:xfrm>
-            <a:off x="3005926" y="4640773"/>
+            <a:off x="2607227" y="3568827"/>
             <a:ext cx="0" cy="115470"/>
           </a:xfrm>
           <a:prstGeom prst="straightConnector1">
@@ -4605,7 +4605,7 @@
         </p:nvSpPr>
         <p:spPr>
           <a:xfrm>
-            <a:off x="1256987" y="8293099"/>
+            <a:off x="858290" y="7221155"/>
             <a:ext cx="1032167" cy="594081"/>
           </a:xfrm>
           <a:prstGeom prst="roundRect">
@@ -4687,7 +4687,7 @@
         </p:nvCxnSpPr>
         <p:spPr>
           <a:xfrm>
-            <a:off x="1773063" y="8887182"/>
+            <a:off x="1374364" y="7815238"/>
             <a:ext cx="0" cy="127565"/>
           </a:xfrm>
           <a:prstGeom prst="straightConnector1">
@@ -4721,7 +4721,7 @@
         </p:nvSpPr>
         <p:spPr>
           <a:xfrm>
-            <a:off x="586410" y="1737788"/>
+            <a:off x="187711" y="665842"/>
             <a:ext cx="527226" cy="362030"/>
           </a:xfrm>
           <a:prstGeom prst="roundRect">
@@ -4778,7 +4778,7 @@
         </p:nvCxnSpPr>
         <p:spPr>
           <a:xfrm flipV="1">
-            <a:off x="1113625" y="1918283"/>
+            <a:off x="714926" y="846339"/>
             <a:ext cx="145844" cy="527"/>
           </a:xfrm>
           <a:prstGeom prst="straightConnector1">
@@ -4812,7 +4812,7 @@
         </p:nvSpPr>
         <p:spPr>
           <a:xfrm>
-            <a:off x="1259479" y="1683434"/>
+            <a:off x="860782" y="611488"/>
             <a:ext cx="1032167" cy="469684"/>
           </a:xfrm>
           <a:prstGeom prst="roundRect">
@@ -4876,7 +4876,7 @@
         </p:nvSpPr>
         <p:spPr>
           <a:xfrm>
-            <a:off x="2461181" y="1679115"/>
+            <a:off x="2062484" y="607169"/>
             <a:ext cx="1032167" cy="474682"/>
           </a:xfrm>
           <a:prstGeom prst="roundRect">
@@ -4940,7 +4940,7 @@
         </p:nvSpPr>
         <p:spPr>
           <a:xfrm>
-            <a:off x="2461181" y="2267636"/>
+            <a:off x="2062484" y="1195690"/>
             <a:ext cx="1032167" cy="474682"/>
           </a:xfrm>
           <a:prstGeom prst="roundRect">
@@ -5004,7 +5004,7 @@
         </p:nvSpPr>
         <p:spPr>
           <a:xfrm>
-            <a:off x="1257431" y="2264698"/>
+            <a:off x="858734" y="1192752"/>
             <a:ext cx="1032167" cy="477620"/>
           </a:xfrm>
           <a:prstGeom prst="roundRect">
@@ -5072,7 +5072,7 @@
         </p:nvCxnSpPr>
         <p:spPr>
           <a:xfrm flipV="1">
-            <a:off x="2291648" y="1916459"/>
+            <a:off x="1892949" y="844515"/>
             <a:ext cx="169534" cy="1829"/>
           </a:xfrm>
           <a:prstGeom prst="straightConnector1">
@@ -5110,7 +5110,7 @@
         </p:nvCxnSpPr>
         <p:spPr>
           <a:xfrm flipH="1" flipV="1">
-            <a:off x="2289590" y="2503505"/>
+            <a:off x="1890893" y="1431559"/>
             <a:ext cx="171583" cy="1470"/>
           </a:xfrm>
           <a:prstGeom prst="straightConnector1">
@@ -5148,7 +5148,7 @@
         </p:nvCxnSpPr>
         <p:spPr>
           <a:xfrm>
-            <a:off x="2977267" y="2153787"/>
+            <a:off x="2578570" y="1081841"/>
             <a:ext cx="1" cy="113838"/>
           </a:xfrm>
           <a:prstGeom prst="straightConnector1">
@@ -5186,7 +5186,7 @@
         </p:nvCxnSpPr>
         <p:spPr>
           <a:xfrm>
-            <a:off x="1772009" y="3604807"/>
+            <a:off x="1373312" y="2532861"/>
             <a:ext cx="1063" cy="254128"/>
           </a:xfrm>
           <a:prstGeom prst="straightConnector1">
@@ -5223,7 +5223,7 @@
         </p:nvCxnSpPr>
         <p:spPr>
           <a:xfrm rot="5400000">
-            <a:off x="69198" y="4905868"/>
+            <a:off x="-329501" y="3833924"/>
             <a:ext cx="2891634" cy="516079"/>
           </a:xfrm>
           <a:prstGeom prst="bentConnector4">
@@ -5263,7 +5263,7 @@
         </p:nvCxnSpPr>
         <p:spPr>
           <a:xfrm rot="16200000" flipH="1">
-            <a:off x="736681" y="6782406"/>
+            <a:off x="337982" y="5710460"/>
             <a:ext cx="851036" cy="189560"/>
           </a:xfrm>
           <a:prstGeom prst="bentConnector2">
@@ -5300,7 +5300,7 @@
         </p:nvSpPr>
         <p:spPr>
           <a:xfrm>
-            <a:off x="4787660" y="1218684"/>
+            <a:off x="4388963" y="146740"/>
             <a:ext cx="1204195" cy="346409"/>
           </a:xfrm>
           <a:prstGeom prst="rect">
@@ -5366,7 +5366,7 @@
         </p:nvSpPr>
         <p:spPr>
           <a:xfrm>
-            <a:off x="4783372" y="1222965"/>
+            <a:off x="4384675" y="151019"/>
             <a:ext cx="1204195" cy="9777000"/>
           </a:xfrm>
           <a:prstGeom prst="rect">
@@ -5413,7 +5413,7 @@
         </p:nvSpPr>
         <p:spPr>
           <a:xfrm>
-            <a:off x="1255925" y="2853769"/>
+            <a:off x="857228" y="1781823"/>
             <a:ext cx="1032167" cy="751044"/>
           </a:xfrm>
           <a:prstGeom prst="roundRect">
@@ -5502,7 +5502,7 @@
         </p:nvSpPr>
         <p:spPr>
           <a:xfrm>
-            <a:off x="3670985" y="2991949"/>
+            <a:off x="3272288" y="1920003"/>
             <a:ext cx="1032167" cy="474682"/>
           </a:xfrm>
           <a:prstGeom prst="roundRect">
@@ -5569,7 +5569,7 @@
         </p:nvCxnSpPr>
         <p:spPr>
           <a:xfrm flipV="1">
-            <a:off x="2288095" y="3229284"/>
+            <a:off x="1889396" y="2157338"/>
             <a:ext cx="1382892" cy="2"/>
           </a:xfrm>
           <a:prstGeom prst="straightConnector1">
@@ -5610,7 +5610,7 @@
         </p:nvCxnSpPr>
         <p:spPr>
           <a:xfrm flipH="1">
-            <a:off x="1772009" y="2742310"/>
+            <a:off x="1373310" y="1670364"/>
             <a:ext cx="1506" cy="111450"/>
           </a:xfrm>
           <a:prstGeom prst="straightConnector1">
@@ -5644,7 +5644,7 @@
         </p:nvSpPr>
         <p:spPr>
           <a:xfrm>
-            <a:off x="3670984" y="8353792"/>
+            <a:off x="3272287" y="7281846"/>
             <a:ext cx="1032167" cy="474682"/>
           </a:xfrm>
           <a:prstGeom prst="roundRect">
@@ -5712,7 +5712,7 @@
         </p:nvCxnSpPr>
         <p:spPr>
           <a:xfrm>
-            <a:off x="2289155" y="8590137"/>
+            <a:off x="1890458" y="7518191"/>
             <a:ext cx="1381831" cy="992"/>
           </a:xfrm>
           <a:prstGeom prst="straightConnector1">
@@ -5750,7 +5750,7 @@
         </p:nvCxnSpPr>
         <p:spPr>
           <a:xfrm flipV="1">
-            <a:off x="4187071" y="3466632"/>
+            <a:off x="3788374" y="2394686"/>
             <a:ext cx="1" cy="4887162"/>
           </a:xfrm>
           <a:prstGeom prst="straightConnector1">
@@ -5790,7 +5790,7 @@
         </p:nvSpPr>
         <p:spPr>
           <a:xfrm>
-            <a:off x="1259089" y="10353246"/>
+            <a:off x="860392" y="9281302"/>
             <a:ext cx="1032167" cy="594081"/>
           </a:xfrm>
           <a:prstGeom prst="roundRect">
@@ -5874,7 +5874,7 @@
         </p:nvSpPr>
         <p:spPr>
           <a:xfrm>
-            <a:off x="4876222" y="10353247"/>
+            <a:off x="4477525" y="9281303"/>
             <a:ext cx="1032167" cy="594081"/>
           </a:xfrm>
           <a:prstGeom prst="roundRect">
@@ -5962,7 +5962,7 @@
         </p:nvCxnSpPr>
         <p:spPr>
           <a:xfrm>
-            <a:off x="1773070" y="9592094"/>
+            <a:off x="1374371" y="8520148"/>
             <a:ext cx="2104" cy="761152"/>
           </a:xfrm>
           <a:prstGeom prst="straightConnector1">
@@ -6006,7 +6006,7 @@
         </p:nvCxnSpPr>
         <p:spPr>
           <a:xfrm>
-            <a:off x="5391799" y="10239997"/>
+            <a:off x="4993102" y="9168053"/>
             <a:ext cx="507" cy="113245"/>
           </a:xfrm>
           <a:prstGeom prst="straightConnector1">
@@ -6049,7 +6049,7 @@
         </p:nvCxnSpPr>
         <p:spPr>
           <a:xfrm>
-            <a:off x="5907883" y="9951324"/>
+            <a:off x="5509186" y="8879378"/>
             <a:ext cx="464013" cy="517948"/>
           </a:xfrm>
           <a:prstGeom prst="bentConnector2">
@@ -6376,9 +6376,12 @@
 </file>
 
 <file path=customXml/item1.xml><?xml version="1.0" encoding="utf-8"?>
-<p:properties xmlns:p="http://schemas.microsoft.com/office/2006/metadata/properties" xmlns:xsi="http://www.w3.org/2001/XMLSchema-instance">
-  <documentManagement/>
-</p:properties>
+<?mso-contentType ?>
+<FormTemplates xmlns="http://schemas.microsoft.com/sharepoint/v3/contenttype/forms">
+  <Display>DocumentLibraryForm</Display>
+  <Edit>DocumentLibraryForm</Edit>
+  <New>DocumentLibraryForm</New>
+</FormTemplates>
 </file>
 
 <file path=customXml/item2.xml><?xml version="1.0" encoding="utf-8"?>
@@ -6431,24 +6434,15 @@
 </file>
 
 <file path=customXml/item3.xml><?xml version="1.0" encoding="utf-8"?>
-<?mso-contentType ?>
-<FormTemplates xmlns="http://schemas.microsoft.com/sharepoint/v3/contenttype/forms">
-  <Display>DocumentLibraryForm</Display>
-  <Edit>DocumentLibraryForm</Edit>
-  <New>DocumentLibraryForm</New>
-</FormTemplates>
+<p:properties xmlns:p="http://schemas.microsoft.com/office/2006/metadata/properties" xmlns:xsi="http://www.w3.org/2001/XMLSchema-instance">
+  <documentManagement/>
+</p:properties>
 </file>
 
 <file path=customXml/itemProps1.xml><?xml version="1.0" encoding="utf-8"?>
-<ds:datastoreItem xmlns:ds="http://schemas.openxmlformats.org/officeDocument/2006/customXml" ds:itemID="{AA05AFCB-176E-411D-8F54-3F7328DC8DF9}">
+<ds:datastoreItem xmlns:ds="http://schemas.openxmlformats.org/officeDocument/2006/customXml" ds:itemID="{93867DCD-913B-4BE7-B218-6A941DDB47CC}">
   <ds:schemaRefs>
-    <ds:schemaRef ds:uri="http://purl.org/dc/dcmitype/"/>
-    <ds:schemaRef ds:uri="http://www.w3.org/XML/1998/namespace"/>
-    <ds:schemaRef ds:uri="http://schemas.openxmlformats.org/package/2006/metadata/core-properties"/>
-    <ds:schemaRef ds:uri="http://schemas.microsoft.com/office/2006/documentManagement/types"/>
-    <ds:schemaRef ds:uri="http://purl.org/dc/terms/"/>
-    <ds:schemaRef ds:uri="http://schemas.microsoft.com/office/2006/metadata/properties"/>
-    <ds:schemaRef ds:uri="http://purl.org/dc/elements/1.1/"/>
+    <ds:schemaRef ds:uri="http://schemas.microsoft.com/sharepoint/v3/contenttype/forms"/>
   </ds:schemaRefs>
 </ds:datastoreItem>
 </file>
@@ -6469,9 +6463,15 @@
 </file>
 
 <file path=customXml/itemProps3.xml><?xml version="1.0" encoding="utf-8"?>
-<ds:datastoreItem xmlns:ds="http://schemas.openxmlformats.org/officeDocument/2006/customXml" ds:itemID="{93867DCD-913B-4BE7-B218-6A941DDB47CC}">
+<ds:datastoreItem xmlns:ds="http://schemas.openxmlformats.org/officeDocument/2006/customXml" ds:itemID="{AA05AFCB-176E-411D-8F54-3F7328DC8DF9}">
   <ds:schemaRefs>
-    <ds:schemaRef ds:uri="http://schemas.microsoft.com/sharepoint/v3/contenttype/forms"/>
+    <ds:schemaRef ds:uri="http://purl.org/dc/dcmitype/"/>
+    <ds:schemaRef ds:uri="http://www.w3.org/XML/1998/namespace"/>
+    <ds:schemaRef ds:uri="http://schemas.openxmlformats.org/package/2006/metadata/core-properties"/>
+    <ds:schemaRef ds:uri="http://schemas.microsoft.com/office/2006/documentManagement/types"/>
+    <ds:schemaRef ds:uri="http://purl.org/dc/terms/"/>
+    <ds:schemaRef ds:uri="http://schemas.microsoft.com/office/2006/metadata/properties"/>
+    <ds:schemaRef ds:uri="http://purl.org/dc/elements/1.1/"/>
   </ds:schemaRefs>
 </ds:datastoreItem>
 </file>
</xml_diff>

<commit_message>
Fixed image resolutions https://jira.hl7.org/browse/FHIR-49551
</commit_message>
<xml_diff>
--- a/input/images-source/sdc-generic-workflow.pptx
+++ b/input/images-source/sdc-generic-workflow.pptx
@@ -303,7 +303,7 @@
             <a:fld id="{C69E31BE-431C-4F96-86FE-0099C953F73C}" type="datetimeFigureOut">
               <a:rPr lang="en-US" smtClean="0"/>
               <a:pPr/>
-              <a:t>9/6/2021</a:t>
+              <a:t>6/28/2025</a:t>
             </a:fld>
             <a:endParaRPr lang="en-US"/>
           </a:p>
@@ -473,7 +473,7 @@
             <a:fld id="{C69E31BE-431C-4F96-86FE-0099C953F73C}" type="datetimeFigureOut">
               <a:rPr lang="en-US" smtClean="0"/>
               <a:pPr/>
-              <a:t>9/6/2021</a:t>
+              <a:t>6/28/2025</a:t>
             </a:fld>
             <a:endParaRPr lang="en-US"/>
           </a:p>
@@ -653,7 +653,7 @@
             <a:fld id="{C69E31BE-431C-4F96-86FE-0099C953F73C}" type="datetimeFigureOut">
               <a:rPr lang="en-US" smtClean="0"/>
               <a:pPr/>
-              <a:t>9/6/2021</a:t>
+              <a:t>6/28/2025</a:t>
             </a:fld>
             <a:endParaRPr lang="en-US"/>
           </a:p>
@@ -823,7 +823,7 @@
             <a:fld id="{C69E31BE-431C-4F96-86FE-0099C953F73C}" type="datetimeFigureOut">
               <a:rPr lang="en-US" smtClean="0"/>
               <a:pPr/>
-              <a:t>9/6/2021</a:t>
+              <a:t>6/28/2025</a:t>
             </a:fld>
             <a:endParaRPr lang="en-US"/>
           </a:p>
@@ -1070,7 +1070,7 @@
             <a:fld id="{C69E31BE-431C-4F96-86FE-0099C953F73C}" type="datetimeFigureOut">
               <a:rPr lang="en-US" smtClean="0"/>
               <a:pPr/>
-              <a:t>9/6/2021</a:t>
+              <a:t>6/28/2025</a:t>
             </a:fld>
             <a:endParaRPr lang="en-US"/>
           </a:p>
@@ -1357,7 +1357,7 @@
             <a:fld id="{C69E31BE-431C-4F96-86FE-0099C953F73C}" type="datetimeFigureOut">
               <a:rPr lang="en-US" smtClean="0"/>
               <a:pPr/>
-              <a:t>9/6/2021</a:t>
+              <a:t>6/28/2025</a:t>
             </a:fld>
             <a:endParaRPr lang="en-US"/>
           </a:p>
@@ -1778,7 +1778,7 @@
             <a:fld id="{C69E31BE-431C-4F96-86FE-0099C953F73C}" type="datetimeFigureOut">
               <a:rPr lang="en-US" smtClean="0"/>
               <a:pPr/>
-              <a:t>9/6/2021</a:t>
+              <a:t>6/28/2025</a:t>
             </a:fld>
             <a:endParaRPr lang="en-US"/>
           </a:p>
@@ -1897,7 +1897,7 @@
             <a:fld id="{C69E31BE-431C-4F96-86FE-0099C953F73C}" type="datetimeFigureOut">
               <a:rPr lang="en-US" smtClean="0"/>
               <a:pPr/>
-              <a:t>9/6/2021</a:t>
+              <a:t>6/28/2025</a:t>
             </a:fld>
             <a:endParaRPr lang="en-US"/>
           </a:p>
@@ -1994,7 +1994,7 @@
             <a:fld id="{C69E31BE-431C-4F96-86FE-0099C953F73C}" type="datetimeFigureOut">
               <a:rPr lang="en-US" smtClean="0"/>
               <a:pPr/>
-              <a:t>9/6/2021</a:t>
+              <a:t>6/28/2025</a:t>
             </a:fld>
             <a:endParaRPr lang="en-US"/>
           </a:p>
@@ -2271,7 +2271,7 @@
             <a:fld id="{C69E31BE-431C-4F96-86FE-0099C953F73C}" type="datetimeFigureOut">
               <a:rPr lang="en-US" smtClean="0"/>
               <a:pPr/>
-              <a:t>9/6/2021</a:t>
+              <a:t>6/28/2025</a:t>
             </a:fld>
             <a:endParaRPr lang="en-US"/>
           </a:p>
@@ -2525,7 +2525,7 @@
             <a:fld id="{C69E31BE-431C-4F96-86FE-0099C953F73C}" type="datetimeFigureOut">
               <a:rPr lang="en-US" smtClean="0"/>
               <a:pPr/>
-              <a:t>9/6/2021</a:t>
+              <a:t>6/28/2025</a:t>
             </a:fld>
             <a:endParaRPr lang="en-US"/>
           </a:p>
@@ -2738,7 +2738,7 @@
             <a:fld id="{C69E31BE-431C-4F96-86FE-0099C953F73C}" type="datetimeFigureOut">
               <a:rPr lang="en-US" smtClean="0"/>
               <a:pPr/>
-              <a:t>9/6/2021</a:t>
+              <a:t>6/28/2025</a:t>
             </a:fld>
             <a:endParaRPr lang="en-US"/>
           </a:p>
@@ -6376,12 +6376,9 @@
 </file>
 
 <file path=customXml/item1.xml><?xml version="1.0" encoding="utf-8"?>
-<?mso-contentType ?>
-<FormTemplates xmlns="http://schemas.microsoft.com/sharepoint/v3/contenttype/forms">
-  <Display>DocumentLibraryForm</Display>
-  <Edit>DocumentLibraryForm</Edit>
-  <New>DocumentLibraryForm</New>
-</FormTemplates>
+<p:properties xmlns:p="http://schemas.microsoft.com/office/2006/metadata/properties" xmlns:xsi="http://www.w3.org/2001/XMLSchema-instance">
+  <documentManagement/>
+</p:properties>
 </file>
 
 <file path=customXml/item2.xml><?xml version="1.0" encoding="utf-8"?>
@@ -6434,15 +6431,24 @@
 </file>
 
 <file path=customXml/item3.xml><?xml version="1.0" encoding="utf-8"?>
-<p:properties xmlns:p="http://schemas.microsoft.com/office/2006/metadata/properties" xmlns:xsi="http://www.w3.org/2001/XMLSchema-instance">
-  <documentManagement/>
-</p:properties>
+<?mso-contentType ?>
+<FormTemplates xmlns="http://schemas.microsoft.com/sharepoint/v3/contenttype/forms">
+  <Display>DocumentLibraryForm</Display>
+  <Edit>DocumentLibraryForm</Edit>
+  <New>DocumentLibraryForm</New>
+</FormTemplates>
 </file>
 
 <file path=customXml/itemProps1.xml><?xml version="1.0" encoding="utf-8"?>
-<ds:datastoreItem xmlns:ds="http://schemas.openxmlformats.org/officeDocument/2006/customXml" ds:itemID="{93867DCD-913B-4BE7-B218-6A941DDB47CC}">
+<ds:datastoreItem xmlns:ds="http://schemas.openxmlformats.org/officeDocument/2006/customXml" ds:itemID="{AA05AFCB-176E-411D-8F54-3F7328DC8DF9}">
   <ds:schemaRefs>
-    <ds:schemaRef ds:uri="http://schemas.microsoft.com/sharepoint/v3/contenttype/forms"/>
+    <ds:schemaRef ds:uri="http://purl.org/dc/dcmitype/"/>
+    <ds:schemaRef ds:uri="http://www.w3.org/XML/1998/namespace"/>
+    <ds:schemaRef ds:uri="http://schemas.openxmlformats.org/package/2006/metadata/core-properties"/>
+    <ds:schemaRef ds:uri="http://schemas.microsoft.com/office/2006/documentManagement/types"/>
+    <ds:schemaRef ds:uri="http://purl.org/dc/terms/"/>
+    <ds:schemaRef ds:uri="http://schemas.microsoft.com/office/2006/metadata/properties"/>
+    <ds:schemaRef ds:uri="http://purl.org/dc/elements/1.1/"/>
   </ds:schemaRefs>
 </ds:datastoreItem>
 </file>
@@ -6463,15 +6469,9 @@
 </file>
 
 <file path=customXml/itemProps3.xml><?xml version="1.0" encoding="utf-8"?>
-<ds:datastoreItem xmlns:ds="http://schemas.openxmlformats.org/officeDocument/2006/customXml" ds:itemID="{AA05AFCB-176E-411D-8F54-3F7328DC8DF9}">
+<ds:datastoreItem xmlns:ds="http://schemas.openxmlformats.org/officeDocument/2006/customXml" ds:itemID="{93867DCD-913B-4BE7-B218-6A941DDB47CC}">
   <ds:schemaRefs>
-    <ds:schemaRef ds:uri="http://purl.org/dc/dcmitype/"/>
-    <ds:schemaRef ds:uri="http://www.w3.org/XML/1998/namespace"/>
-    <ds:schemaRef ds:uri="http://schemas.openxmlformats.org/package/2006/metadata/core-properties"/>
-    <ds:schemaRef ds:uri="http://schemas.microsoft.com/office/2006/documentManagement/types"/>
-    <ds:schemaRef ds:uri="http://purl.org/dc/terms/"/>
-    <ds:schemaRef ds:uri="http://schemas.microsoft.com/office/2006/metadata/properties"/>
-    <ds:schemaRef ds:uri="http://purl.org/dc/elements/1.1/"/>
+    <ds:schemaRef ds:uri="http://schemas.microsoft.com/sharepoint/v3/contenttype/forms"/>
   </ds:schemaRefs>
 </ds:datastoreItem>
 </file>
</xml_diff>